<commit_message>
Aktualizacja linków o bardzo dobre filmy z deskrypcją
</commit_message>
<xml_diff>
--- a/00. Git - tutorial - Zasoby sieciowe (sznurki).pptx
+++ b/00. Git - tutorial - Zasoby sieciowe (sznurki).pptx
@@ -115,7 +115,7 @@
   </p:defaultTextStyle>
   <p:extLst>
     <p:ext uri="{EFAFB233-063F-42B5-8137-9DF3F51BA10A}">
-      <p15:sldGuideLst xmlns:p15="http://schemas.microsoft.com/office/powerpoint/2012/main">
+      <p15:sldGuideLst xmlns:p15="http://schemas.microsoft.com/office/powerpoint/2012/main" xmlns="">
         <p15:guide id="1" orient="horz" pos="1620">
           <p15:clr>
             <a:srgbClr val="A4A3A4"/>
@@ -214,7 +214,7 @@
           <a:p>
             <a:fld id="{F4CC630C-9AF6-49E5-9919-D038F5C57BFC}" type="datetimeFigureOut">
               <a:rPr lang="en-US" smtClean="0"/>
-              <a:t>4/28/2021</a:t>
+              <a:t>5/5/2021</a:t>
             </a:fld>
             <a:endParaRPr lang="en-US"/>
           </a:p>
@@ -663,7 +663,7 @@
           <a:p>
             <a:fld id="{F19922E3-32CA-40BB-949D-A04DA951D7AE}" type="datetimeFigureOut">
               <a:rPr lang="en-US" smtClean="0"/>
-              <a:t>4/28/2021</a:t>
+              <a:t>5/5/2021</a:t>
             </a:fld>
             <a:endParaRPr lang="en-US"/>
           </a:p>
@@ -833,7 +833,7 @@
           <a:p>
             <a:fld id="{F19922E3-32CA-40BB-949D-A04DA951D7AE}" type="datetimeFigureOut">
               <a:rPr lang="en-US" smtClean="0"/>
-              <a:t>4/28/2021</a:t>
+              <a:t>5/5/2021</a:t>
             </a:fld>
             <a:endParaRPr lang="en-US"/>
           </a:p>
@@ -1013,7 +1013,7 @@
           <a:p>
             <a:fld id="{F19922E3-32CA-40BB-949D-A04DA951D7AE}" type="datetimeFigureOut">
               <a:rPr lang="en-US" smtClean="0"/>
-              <a:t>4/28/2021</a:t>
+              <a:t>5/5/2021</a:t>
             </a:fld>
             <a:endParaRPr lang="en-US"/>
           </a:p>
@@ -1183,7 +1183,7 @@
           <a:p>
             <a:fld id="{F19922E3-32CA-40BB-949D-A04DA951D7AE}" type="datetimeFigureOut">
               <a:rPr lang="en-US" smtClean="0"/>
-              <a:t>4/28/2021</a:t>
+              <a:t>5/5/2021</a:t>
             </a:fld>
             <a:endParaRPr lang="en-US"/>
           </a:p>
@@ -1429,7 +1429,7 @@
           <a:p>
             <a:fld id="{F19922E3-32CA-40BB-949D-A04DA951D7AE}" type="datetimeFigureOut">
               <a:rPr lang="en-US" smtClean="0"/>
-              <a:t>4/28/2021</a:t>
+              <a:t>5/5/2021</a:t>
             </a:fld>
             <a:endParaRPr lang="en-US"/>
           </a:p>
@@ -1717,7 +1717,7 @@
           <a:p>
             <a:fld id="{F19922E3-32CA-40BB-949D-A04DA951D7AE}" type="datetimeFigureOut">
               <a:rPr lang="en-US" smtClean="0"/>
-              <a:t>4/28/2021</a:t>
+              <a:t>5/5/2021</a:t>
             </a:fld>
             <a:endParaRPr lang="en-US"/>
           </a:p>
@@ -2144,7 +2144,7 @@
           <a:p>
             <a:fld id="{F19922E3-32CA-40BB-949D-A04DA951D7AE}" type="datetimeFigureOut">
               <a:rPr lang="en-US" smtClean="0"/>
-              <a:t>4/28/2021</a:t>
+              <a:t>5/5/2021</a:t>
             </a:fld>
             <a:endParaRPr lang="en-US"/>
           </a:p>
@@ -2262,7 +2262,7 @@
           <a:p>
             <a:fld id="{F19922E3-32CA-40BB-949D-A04DA951D7AE}" type="datetimeFigureOut">
               <a:rPr lang="en-US" smtClean="0"/>
-              <a:t>4/28/2021</a:t>
+              <a:t>5/5/2021</a:t>
             </a:fld>
             <a:endParaRPr lang="en-US"/>
           </a:p>
@@ -2357,7 +2357,7 @@
           <a:p>
             <a:fld id="{F19922E3-32CA-40BB-949D-A04DA951D7AE}" type="datetimeFigureOut">
               <a:rPr lang="en-US" smtClean="0"/>
-              <a:t>4/28/2021</a:t>
+              <a:t>5/5/2021</a:t>
             </a:fld>
             <a:endParaRPr lang="en-US"/>
           </a:p>
@@ -2634,7 +2634,7 @@
           <a:p>
             <a:fld id="{F19922E3-32CA-40BB-949D-A04DA951D7AE}" type="datetimeFigureOut">
               <a:rPr lang="en-US" smtClean="0"/>
-              <a:t>4/28/2021</a:t>
+              <a:t>5/5/2021</a:t>
             </a:fld>
             <a:endParaRPr lang="en-US"/>
           </a:p>
@@ -2887,7 +2887,7 @@
           <a:p>
             <a:fld id="{F19922E3-32CA-40BB-949D-A04DA951D7AE}" type="datetimeFigureOut">
               <a:rPr lang="en-US" smtClean="0"/>
-              <a:t>4/28/2021</a:t>
+              <a:t>5/5/2021</a:t>
             </a:fld>
             <a:endParaRPr lang="en-US"/>
           </a:p>
@@ -3109,7 +3109,7 @@
           <a:p>
             <a:fld id="{F19922E3-32CA-40BB-949D-A04DA951D7AE}" type="datetimeFigureOut">
               <a:rPr lang="en-US" smtClean="0"/>
-              <a:t>4/28/2021</a:t>
+              <a:t>5/5/2021</a:t>
             </a:fld>
             <a:endParaRPr lang="en-US"/>
           </a:p>
@@ -5004,6 +5004,55 @@
             </a:endParaRPr>
           </a:p>
           <a:p>
+            <a:r>
+              <a:rPr lang="pl-PL" sz="1600" dirty="0" smtClean="0">
+                <a:latin typeface="+mj-lt"/>
+              </a:rPr>
+              <a:t>Filmy oficjalne GitLab (z deskrypcją, więc można </a:t>
+            </a:r>
+            <a:r>
+              <a:rPr lang="pl-PL" sz="1600">
+                <a:latin typeface="+mj-lt"/>
+              </a:rPr>
+              <a:t>też </a:t>
+            </a:r>
+            <a:r>
+              <a:rPr lang="pl-PL" sz="1600" smtClean="0">
+                <a:latin typeface="+mj-lt"/>
+              </a:rPr>
+              <a:t>poczytać)</a:t>
+            </a:r>
+          </a:p>
+          <a:p>
+            <a:pPr marL="0" indent="0">
+              <a:buNone/>
+            </a:pPr>
+            <a:r>
+              <a:rPr lang="pl-PL" sz="1600" smtClean="0">
+                <a:latin typeface="+mj-lt"/>
+                <a:hlinkClick r:id="rId5"/>
+              </a:rPr>
+              <a:t>https</a:t>
+            </a:r>
+            <a:r>
+              <a:rPr lang="pl-PL" sz="1600">
+                <a:latin typeface="+mj-lt"/>
+                <a:hlinkClick r:id="rId5"/>
+              </a:rPr>
+              <a:t>://</a:t>
+            </a:r>
+            <a:r>
+              <a:rPr lang="pl-PL" sz="1600" smtClean="0">
+                <a:latin typeface="+mj-lt"/>
+                <a:hlinkClick r:id="rId5"/>
+              </a:rPr>
+              <a:t>www.youtube.com/c/Gitlab/videos?view=0&amp;sort=p&amp;flow=grid</a:t>
+            </a:r>
+            <a:endParaRPr lang="pl-PL" sz="1600" smtClean="0">
+              <a:latin typeface="+mj-lt"/>
+            </a:endParaRPr>
+          </a:p>
+          <a:p>
             <a:endParaRPr lang="pl-PL" sz="1600" dirty="0" smtClean="0">
               <a:latin typeface="+mj-lt"/>
             </a:endParaRPr>
@@ -5061,7 +5110,7 @@
           <p:nvPr/>
         </p:nvPicPr>
         <p:blipFill>
-          <a:blip r:embed="rId5" cstate="print">
+          <a:blip r:embed="rId6" cstate="print">
             <a:extLst>
               <a:ext uri="{28A0092B-C50C-407E-A947-70E740481C1C}">
                 <a14:useLocalDpi xmlns:a14="http://schemas.microsoft.com/office/drawing/2010/main" val="0"/>
@@ -5216,11 +5265,7 @@
           <a:p>
             <a:r>
               <a:rPr lang="en-US" sz="1600" dirty="0"/>
-              <a:t>Introducing the GitLab Issue </a:t>
-            </a:r>
-            <a:r>
-              <a:rPr lang="en-US" sz="1600" dirty="0"/>
-              <a:t>Board</a:t>
+              <a:t>Introducing the GitLab Issue Board</a:t>
             </a:r>
             <a:endParaRPr lang="pl-PL" sz="1600" dirty="0"/>
           </a:p>

</xml_diff>